<commit_message>
Fixing predeployment steps and image
</commit_message>
<xml_diff>
--- a/docs/deployment_guide/images/nvidia-parabricks-architecture-diagram.pptx
+++ b/docs/deployment_guide/images/nvidia-parabricks-architecture-diagram.pptx
@@ -259,7 +259,7 @@
           <a:p>
             <a:fld id="{667386E5-D34E-B147-80B4-38EB382B4330}" type="datetimeFigureOut">
               <a:rPr lang="en-US" smtClean="0"/>
-              <a:t>5/9/2022</a:t>
+              <a:t>5/10/2022</a:t>
             </a:fld>
             <a:endParaRPr lang="en-US"/>
           </a:p>
@@ -457,7 +457,7 @@
           <a:p>
             <a:fld id="{667386E5-D34E-B147-80B4-38EB382B4330}" type="datetimeFigureOut">
               <a:rPr lang="en-US" smtClean="0"/>
-              <a:t>5/9/2022</a:t>
+              <a:t>5/10/2022</a:t>
             </a:fld>
             <a:endParaRPr lang="en-US"/>
           </a:p>
@@ -665,7 +665,7 @@
           <a:p>
             <a:fld id="{667386E5-D34E-B147-80B4-38EB382B4330}" type="datetimeFigureOut">
               <a:rPr lang="en-US" smtClean="0"/>
-              <a:t>5/9/2022</a:t>
+              <a:t>5/10/2022</a:t>
             </a:fld>
             <a:endParaRPr lang="en-US"/>
           </a:p>
@@ -863,7 +863,7 @@
           <a:p>
             <a:fld id="{667386E5-D34E-B147-80B4-38EB382B4330}" type="datetimeFigureOut">
               <a:rPr lang="en-US" smtClean="0"/>
-              <a:t>5/9/2022</a:t>
+              <a:t>5/10/2022</a:t>
             </a:fld>
             <a:endParaRPr lang="en-US"/>
           </a:p>
@@ -1138,7 +1138,7 @@
           <a:p>
             <a:fld id="{667386E5-D34E-B147-80B4-38EB382B4330}" type="datetimeFigureOut">
               <a:rPr lang="en-US" smtClean="0"/>
-              <a:t>5/9/2022</a:t>
+              <a:t>5/10/2022</a:t>
             </a:fld>
             <a:endParaRPr lang="en-US"/>
           </a:p>
@@ -1403,7 +1403,7 @@
           <a:p>
             <a:fld id="{667386E5-D34E-B147-80B4-38EB382B4330}" type="datetimeFigureOut">
               <a:rPr lang="en-US" smtClean="0"/>
-              <a:t>5/9/2022</a:t>
+              <a:t>5/10/2022</a:t>
             </a:fld>
             <a:endParaRPr lang="en-US"/>
           </a:p>
@@ -1815,7 +1815,7 @@
           <a:p>
             <a:fld id="{667386E5-D34E-B147-80B4-38EB382B4330}" type="datetimeFigureOut">
               <a:rPr lang="en-US" smtClean="0"/>
-              <a:t>5/9/2022</a:t>
+              <a:t>5/10/2022</a:t>
             </a:fld>
             <a:endParaRPr lang="en-US"/>
           </a:p>
@@ -1956,7 +1956,7 @@
           <a:p>
             <a:fld id="{667386E5-D34E-B147-80B4-38EB382B4330}" type="datetimeFigureOut">
               <a:rPr lang="en-US" smtClean="0"/>
-              <a:t>5/9/2022</a:t>
+              <a:t>5/10/2022</a:t>
             </a:fld>
             <a:endParaRPr lang="en-US"/>
           </a:p>
@@ -2069,7 +2069,7 @@
           <a:p>
             <a:fld id="{667386E5-D34E-B147-80B4-38EB382B4330}" type="datetimeFigureOut">
               <a:rPr lang="en-US" smtClean="0"/>
-              <a:t>5/9/2022</a:t>
+              <a:t>5/10/2022</a:t>
             </a:fld>
             <a:endParaRPr lang="en-US"/>
           </a:p>
@@ -2380,7 +2380,7 @@
           <a:p>
             <a:fld id="{667386E5-D34E-B147-80B4-38EB382B4330}" type="datetimeFigureOut">
               <a:rPr lang="en-US" smtClean="0"/>
-              <a:t>5/9/2022</a:t>
+              <a:t>5/10/2022</a:t>
             </a:fld>
             <a:endParaRPr lang="en-US"/>
           </a:p>
@@ -2668,7 +2668,7 @@
           <a:p>
             <a:fld id="{667386E5-D34E-B147-80B4-38EB382B4330}" type="datetimeFigureOut">
               <a:rPr lang="en-US" smtClean="0"/>
-              <a:t>5/9/2022</a:t>
+              <a:t>5/10/2022</a:t>
             </a:fld>
             <a:endParaRPr lang="en-US"/>
           </a:p>
@@ -2909,7 +2909,7 @@
           <a:p>
             <a:fld id="{667386E5-D34E-B147-80B4-38EB382B4330}" type="datetimeFigureOut">
               <a:rPr lang="en-US" smtClean="0"/>
-              <a:t>5/9/2022</a:t>
+              <a:t>5/10/2022</a:t>
             </a:fld>
             <a:endParaRPr lang="en-US"/>
           </a:p>
@@ -3444,8 +3444,8 @@
         </p:nvSpPr>
         <p:spPr>
           <a:xfrm>
-            <a:off x="640492" y="924056"/>
-            <a:ext cx="8789258" cy="4537630"/>
+            <a:off x="640491" y="924056"/>
+            <a:ext cx="8970233" cy="4537630"/>
           </a:xfrm>
           <a:prstGeom prst="rect">
             <a:avLst/>
@@ -3550,8 +3550,8 @@
         </p:nvSpPr>
         <p:spPr>
           <a:xfrm>
-            <a:off x="1021493" y="1396314"/>
-            <a:ext cx="3004107" cy="4194861"/>
+            <a:off x="1021494" y="1396314"/>
+            <a:ext cx="2961640" cy="4194861"/>
           </a:xfrm>
           <a:prstGeom prst="rect">
             <a:avLst/>
@@ -3620,8 +3620,8 @@
         </p:nvSpPr>
         <p:spPr>
           <a:xfrm>
-            <a:off x="5356358" y="1396314"/>
-            <a:ext cx="2885600" cy="4194862"/>
+            <a:off x="5411529" y="1396314"/>
+            <a:ext cx="2948935" cy="4194862"/>
           </a:xfrm>
           <a:prstGeom prst="rect">
             <a:avLst/>
@@ -3691,7 +3691,7 @@
         <p:spPr>
           <a:xfrm>
             <a:off x="1278632" y="1765174"/>
-            <a:ext cx="2502536" cy="1495980"/>
+            <a:ext cx="2502536" cy="1529916"/>
           </a:xfrm>
           <a:prstGeom prst="rect">
             <a:avLst/>
@@ -3798,8 +3798,8 @@
         </p:nvSpPr>
         <p:spPr>
           <a:xfrm>
-            <a:off x="5490519" y="1765174"/>
-            <a:ext cx="2505086" cy="1495980"/>
+            <a:off x="5633394" y="1765174"/>
+            <a:ext cx="2505086" cy="1529916"/>
           </a:xfrm>
           <a:prstGeom prst="rect">
             <a:avLst/>
@@ -3884,7 +3884,7 @@
         </p:blipFill>
         <p:spPr>
           <a:xfrm>
-            <a:off x="5490519" y="1766763"/>
+            <a:off x="5633394" y="1766763"/>
             <a:ext cx="381000" cy="381000"/>
           </a:xfrm>
           <a:prstGeom prst="rect">
@@ -4014,7 +4014,7 @@
         </p:nvSpPr>
         <p:spPr>
           <a:xfrm>
-            <a:off x="5490518" y="3461179"/>
+            <a:off x="5633393" y="3461179"/>
             <a:ext cx="2505086" cy="1834720"/>
           </a:xfrm>
           <a:prstGeom prst="rect">
@@ -4100,7 +4100,7 @@
         </p:blipFill>
         <p:spPr>
           <a:xfrm>
-            <a:off x="5485755" y="3451654"/>
+            <a:off x="5628630" y="3451654"/>
             <a:ext cx="381000" cy="381000"/>
           </a:xfrm>
           <a:prstGeom prst="rect">
@@ -4358,7 +4358,7 @@
         </p:blipFill>
         <p:spPr bwMode="auto">
           <a:xfrm>
-            <a:off x="6493669" y="4065528"/>
+            <a:off x="6636544" y="4065528"/>
             <a:ext cx="457200" cy="457200"/>
           </a:xfrm>
           <a:prstGeom prst="rect">
@@ -4566,7 +4566,7 @@
         </p:nvSpPr>
         <p:spPr bwMode="auto">
           <a:xfrm>
-            <a:off x="6224084" y="4503239"/>
+            <a:off x="6366959" y="4503239"/>
             <a:ext cx="1115568" cy="461665"/>
           </a:xfrm>
           <a:prstGeom prst="rect">
@@ -4794,7 +4794,7 @@
         </p:nvSpPr>
         <p:spPr bwMode="auto">
           <a:xfrm>
-            <a:off x="7700715" y="2274258"/>
+            <a:off x="7877882" y="2274258"/>
             <a:ext cx="2281238" cy="276999"/>
           </a:xfrm>
           <a:prstGeom prst="rect">
@@ -5015,7 +5015,7 @@
         </p:nvSpPr>
         <p:spPr bwMode="auto">
           <a:xfrm>
-            <a:off x="3983133" y="1109920"/>
+            <a:off x="4029793" y="1109920"/>
             <a:ext cx="1403350" cy="276999"/>
           </a:xfrm>
           <a:prstGeom prst="rect">
@@ -5174,10 +5174,10 @@
         </p:nvGrpSpPr>
         <p:grpSpPr>
           <a:xfrm>
-            <a:off x="1888893" y="2303745"/>
-            <a:ext cx="1234766" cy="735786"/>
+            <a:off x="1346510" y="2398382"/>
+            <a:ext cx="1234766" cy="745557"/>
             <a:chOff x="3959051" y="3922713"/>
-            <a:chExt cx="1234766" cy="735786"/>
+            <a:chExt cx="1234766" cy="745557"/>
           </a:xfrm>
         </p:grpSpPr>
         <p:sp>
@@ -5196,7 +5196,7 @@
           </p:nvSpPr>
           <p:spPr bwMode="auto">
             <a:xfrm>
-              <a:off x="3959051" y="4381500"/>
+              <a:off x="3959051" y="4391271"/>
               <a:ext cx="1234766" cy="276999"/>
             </a:xfrm>
             <a:prstGeom prst="rect">
@@ -5416,10 +5416,10 @@
         </p:nvGrpSpPr>
         <p:grpSpPr>
           <a:xfrm>
-            <a:off x="6104886" y="2303745"/>
-            <a:ext cx="1234766" cy="735786"/>
-            <a:chOff x="3959051" y="3922713"/>
-            <a:chExt cx="1234766" cy="735786"/>
+            <a:off x="6948615" y="2412663"/>
+            <a:ext cx="1234766" cy="674199"/>
+            <a:chOff x="3959051" y="3984300"/>
+            <a:chExt cx="1234766" cy="674199"/>
           </a:xfrm>
         </p:grpSpPr>
         <p:sp>
@@ -5612,7 +5612,7 @@
           </p:blipFill>
           <p:spPr bwMode="auto">
             <a:xfrm>
-              <a:off x="4355307" y="3922713"/>
+              <a:off x="4302418" y="3984300"/>
               <a:ext cx="457200" cy="457200"/>
             </a:xfrm>
             <a:prstGeom prst="rect">
@@ -5731,7 +5731,7 @@
         </p:blipFill>
         <p:spPr bwMode="auto">
           <a:xfrm>
-            <a:off x="8454854" y="1521716"/>
+            <a:off x="8637501" y="1521716"/>
             <a:ext cx="762000" cy="762000"/>
           </a:xfrm>
           <a:prstGeom prst="rect">
@@ -5760,6 +5760,594 @@
               </a14:hiddenLine>
             </a:ext>
           </a:extLst>
+        </p:spPr>
+      </p:pic>
+      <p:pic>
+        <p:nvPicPr>
+          <p:cNvPr id="36" name="Graphic 17">
+            <a:extLst>
+              <a:ext uri="{FF2B5EF4-FFF2-40B4-BE49-F238E27FC236}">
+                <a16:creationId xmlns:a16="http://schemas.microsoft.com/office/drawing/2014/main" id="{6DB8C22F-8DA1-42CE-A0C0-F2C0091BFC80}"/>
+              </a:ext>
+            </a:extLst>
+          </p:cNvPr>
+          <p:cNvPicPr>
+            <a:picLocks noChangeAspect="1" noChangeArrowheads="1"/>
+          </p:cNvPicPr>
+          <p:nvPr/>
+        </p:nvPicPr>
+        <p:blipFill>
+          <a:blip r:embed="rId16">
+            <a:extLst>
+              <a:ext uri="{28A0092B-C50C-407E-A947-70E740481C1C}">
+                <a14:useLocalDpi xmlns:a14="http://schemas.microsoft.com/office/drawing/2010/main" val="0"/>
+              </a:ext>
+            </a:extLst>
+          </a:blip>
+          <a:srcRect/>
+          <a:stretch>
+            <a:fillRect/>
+          </a:stretch>
+        </p:blipFill>
+        <p:spPr bwMode="auto">
+          <a:xfrm>
+            <a:off x="2905039" y="2380038"/>
+            <a:ext cx="469900" cy="469900"/>
+          </a:xfrm>
+          <a:prstGeom prst="rect">
+            <a:avLst/>
+          </a:prstGeom>
+          <a:noFill/>
+          <a:ln>
+            <a:noFill/>
+          </a:ln>
+          <a:extLst>
+            <a:ext uri="{909E8E84-426E-40DD-AFC4-6F175D3DCCD1}">
+              <a14:hiddenFill xmlns:a14="http://schemas.microsoft.com/office/drawing/2010/main">
+                <a:solidFill>
+                  <a:srgbClr val="FFFFFF"/>
+                </a:solidFill>
+              </a14:hiddenFill>
+            </a:ext>
+            <a:ext uri="{91240B29-F687-4F45-9708-019B960494DF}">
+              <a14:hiddenLine xmlns:a14="http://schemas.microsoft.com/office/drawing/2010/main" w="9525">
+                <a:solidFill>
+                  <a:srgbClr val="000000"/>
+                </a:solidFill>
+                <a:miter lim="800000"/>
+                <a:headEnd/>
+                <a:tailEnd/>
+              </a14:hiddenLine>
+            </a:ext>
+          </a:extLst>
+        </p:spPr>
+      </p:pic>
+      <p:sp>
+        <p:nvSpPr>
+          <p:cNvPr id="37" name="TextBox 18">
+            <a:extLst>
+              <a:ext uri="{FF2B5EF4-FFF2-40B4-BE49-F238E27FC236}">
+                <a16:creationId xmlns:a16="http://schemas.microsoft.com/office/drawing/2014/main" id="{D5C49F77-6A28-4C2B-8A2C-104EE5EF4207}"/>
+              </a:ext>
+            </a:extLst>
+          </p:cNvPr>
+          <p:cNvSpPr txBox="1">
+            <a:spLocks noChangeArrowheads="1"/>
+          </p:cNvSpPr>
+          <p:nvPr/>
+        </p:nvSpPr>
+        <p:spPr bwMode="auto">
+          <a:xfrm>
+            <a:off x="2309849" y="2855816"/>
+            <a:ext cx="1767152" cy="276999"/>
+          </a:xfrm>
+          <a:prstGeom prst="rect">
+            <a:avLst/>
+          </a:prstGeom>
+          <a:noFill/>
+          <a:ln>
+            <a:noFill/>
+          </a:ln>
+          <a:extLst>
+            <a:ext uri="{909E8E84-426E-40DD-AFC4-6F175D3DCCD1}">
+              <a14:hiddenFill xmlns:a14="http://schemas.microsoft.com/office/drawing/2010/main">
+                <a:solidFill>
+                  <a:srgbClr val="FFFFFF"/>
+                </a:solidFill>
+              </a14:hiddenFill>
+            </a:ext>
+            <a:ext uri="{91240B29-F687-4F45-9708-019B960494DF}">
+              <a14:hiddenLine xmlns:a14="http://schemas.microsoft.com/office/drawing/2010/main" w="9525">
+                <a:solidFill>
+                  <a:srgbClr val="000000"/>
+                </a:solidFill>
+                <a:miter lim="800000"/>
+                <a:headEnd/>
+                <a:tailEnd/>
+              </a14:hiddenLine>
+            </a:ext>
+          </a:extLst>
+        </p:spPr>
+        <p:txBody>
+          <a:bodyPr>
+            <a:spAutoFit/>
+          </a:bodyPr>
+          <a:lstStyle>
+            <a:lvl1pPr>
+              <a:defRPr>
+                <a:solidFill>
+                  <a:schemeClr val="tx1"/>
+                </a:solidFill>
+                <a:latin typeface="Calibri" panose="020F0502020204030204" pitchFamily="34" charset="0"/>
+              </a:defRPr>
+            </a:lvl1pPr>
+            <a:lvl2pPr marL="742950" indent="-285750">
+              <a:defRPr>
+                <a:solidFill>
+                  <a:schemeClr val="tx1"/>
+                </a:solidFill>
+                <a:latin typeface="Calibri" panose="020F0502020204030204" pitchFamily="34" charset="0"/>
+              </a:defRPr>
+            </a:lvl2pPr>
+            <a:lvl3pPr marL="1143000" indent="-228600">
+              <a:defRPr>
+                <a:solidFill>
+                  <a:schemeClr val="tx1"/>
+                </a:solidFill>
+                <a:latin typeface="Calibri" panose="020F0502020204030204" pitchFamily="34" charset="0"/>
+              </a:defRPr>
+            </a:lvl3pPr>
+            <a:lvl4pPr marL="1600200" indent="-228600">
+              <a:defRPr>
+                <a:solidFill>
+                  <a:schemeClr val="tx1"/>
+                </a:solidFill>
+                <a:latin typeface="Calibri" panose="020F0502020204030204" pitchFamily="34" charset="0"/>
+              </a:defRPr>
+            </a:lvl4pPr>
+            <a:lvl5pPr marL="2057400" indent="-228600">
+              <a:defRPr>
+                <a:solidFill>
+                  <a:schemeClr val="tx1"/>
+                </a:solidFill>
+                <a:latin typeface="Calibri" panose="020F0502020204030204" pitchFamily="34" charset="0"/>
+              </a:defRPr>
+            </a:lvl5pPr>
+            <a:lvl6pPr marL="2514600" indent="-228600" eaLnBrk="0" fontAlgn="base" hangingPunct="0">
+              <a:spcBef>
+                <a:spcPct val="0"/>
+              </a:spcBef>
+              <a:spcAft>
+                <a:spcPct val="0"/>
+              </a:spcAft>
+              <a:defRPr>
+                <a:solidFill>
+                  <a:schemeClr val="tx1"/>
+                </a:solidFill>
+                <a:latin typeface="Calibri" panose="020F0502020204030204" pitchFamily="34" charset="0"/>
+              </a:defRPr>
+            </a:lvl6pPr>
+            <a:lvl7pPr marL="2971800" indent="-228600" eaLnBrk="0" fontAlgn="base" hangingPunct="0">
+              <a:spcBef>
+                <a:spcPct val="0"/>
+              </a:spcBef>
+              <a:spcAft>
+                <a:spcPct val="0"/>
+              </a:spcAft>
+              <a:defRPr>
+                <a:solidFill>
+                  <a:schemeClr val="tx1"/>
+                </a:solidFill>
+                <a:latin typeface="Calibri" panose="020F0502020204030204" pitchFamily="34" charset="0"/>
+              </a:defRPr>
+            </a:lvl7pPr>
+            <a:lvl8pPr marL="3429000" indent="-228600" eaLnBrk="0" fontAlgn="base" hangingPunct="0">
+              <a:spcBef>
+                <a:spcPct val="0"/>
+              </a:spcBef>
+              <a:spcAft>
+                <a:spcPct val="0"/>
+              </a:spcAft>
+              <a:defRPr>
+                <a:solidFill>
+                  <a:schemeClr val="tx1"/>
+                </a:solidFill>
+                <a:latin typeface="Calibri" panose="020F0502020204030204" pitchFamily="34" charset="0"/>
+              </a:defRPr>
+            </a:lvl8pPr>
+            <a:lvl9pPr marL="3886200" indent="-228600" eaLnBrk="0" fontAlgn="base" hangingPunct="0">
+              <a:spcBef>
+                <a:spcPct val="0"/>
+              </a:spcBef>
+              <a:spcAft>
+                <a:spcPct val="0"/>
+              </a:spcAft>
+              <a:defRPr>
+                <a:solidFill>
+                  <a:schemeClr val="tx1"/>
+                </a:solidFill>
+                <a:latin typeface="Calibri" panose="020F0502020204030204" pitchFamily="34" charset="0"/>
+              </a:defRPr>
+            </a:lvl9pPr>
+          </a:lstStyle>
+          <a:p>
+            <a:pPr algn="ctr" eaLnBrk="1" hangingPunct="1"/>
+            <a:r>
+              <a:rPr lang="en-US" altLang="en-US" sz="1200" dirty="0">
+                <a:solidFill>
+                  <a:srgbClr val="232F3E"/>
+                </a:solidFill>
+                <a:latin typeface="Arial" panose="020B0604020202020204" pitchFamily="34" charset="0"/>
+                <a:cs typeface="Arial" panose="020B0604020202020204" pitchFamily="34" charset="0"/>
+              </a:rPr>
+              <a:t>Bastion host</a:t>
+            </a:r>
+          </a:p>
+        </p:txBody>
+      </p:sp>
+      <p:pic>
+        <p:nvPicPr>
+          <p:cNvPr id="38" name="Graphic 19">
+            <a:extLst>
+              <a:ext uri="{FF2B5EF4-FFF2-40B4-BE49-F238E27FC236}">
+                <a16:creationId xmlns:a16="http://schemas.microsoft.com/office/drawing/2014/main" id="{CE22917F-8568-478B-A63D-E25D2F8E4946}"/>
+              </a:ext>
+            </a:extLst>
+          </p:cNvPr>
+          <p:cNvPicPr>
+            <a:picLocks noChangeAspect="1" noChangeArrowheads="1"/>
+          </p:cNvPicPr>
+          <p:nvPr/>
+        </p:nvPicPr>
+        <p:blipFill>
+          <a:blip r:embed="rId16">
+            <a:extLst>
+              <a:ext uri="{28A0092B-C50C-407E-A947-70E740481C1C}">
+                <a14:useLocalDpi xmlns:a14="http://schemas.microsoft.com/office/drawing/2010/main" val="0"/>
+              </a:ext>
+            </a:extLst>
+          </a:blip>
+          <a:srcRect/>
+          <a:stretch>
+            <a:fillRect/>
+          </a:stretch>
+        </p:blipFill>
+        <p:spPr bwMode="auto">
+          <a:xfrm>
+            <a:off x="6041476" y="2380038"/>
+            <a:ext cx="469900" cy="469900"/>
+          </a:xfrm>
+          <a:prstGeom prst="rect">
+            <a:avLst/>
+          </a:prstGeom>
+          <a:noFill/>
+          <a:ln>
+            <a:noFill/>
+          </a:ln>
+          <a:extLst>
+            <a:ext uri="{909E8E84-426E-40DD-AFC4-6F175D3DCCD1}">
+              <a14:hiddenFill xmlns:a14="http://schemas.microsoft.com/office/drawing/2010/main">
+                <a:solidFill>
+                  <a:srgbClr val="FFFFFF"/>
+                </a:solidFill>
+              </a14:hiddenFill>
+            </a:ext>
+            <a:ext uri="{91240B29-F687-4F45-9708-019B960494DF}">
+              <a14:hiddenLine xmlns:a14="http://schemas.microsoft.com/office/drawing/2010/main" w="9525">
+                <a:solidFill>
+                  <a:srgbClr val="000000"/>
+                </a:solidFill>
+                <a:miter lim="800000"/>
+                <a:headEnd/>
+                <a:tailEnd/>
+              </a14:hiddenLine>
+            </a:ext>
+          </a:extLst>
+        </p:spPr>
+      </p:pic>
+      <p:sp>
+        <p:nvSpPr>
+          <p:cNvPr id="39" name="TextBox 20">
+            <a:extLst>
+              <a:ext uri="{FF2B5EF4-FFF2-40B4-BE49-F238E27FC236}">
+                <a16:creationId xmlns:a16="http://schemas.microsoft.com/office/drawing/2014/main" id="{A7152D4A-E9D8-4810-B4E0-3F8E9984823A}"/>
+              </a:ext>
+            </a:extLst>
+          </p:cNvPr>
+          <p:cNvSpPr txBox="1">
+            <a:spLocks noChangeArrowheads="1"/>
+          </p:cNvSpPr>
+          <p:nvPr/>
+        </p:nvSpPr>
+        <p:spPr bwMode="auto">
+          <a:xfrm>
+            <a:off x="5433143" y="2807429"/>
+            <a:ext cx="1767152" cy="276999"/>
+          </a:xfrm>
+          <a:prstGeom prst="rect">
+            <a:avLst/>
+          </a:prstGeom>
+          <a:noFill/>
+          <a:ln>
+            <a:noFill/>
+          </a:ln>
+          <a:extLst>
+            <a:ext uri="{909E8E84-426E-40DD-AFC4-6F175D3DCCD1}">
+              <a14:hiddenFill xmlns:a14="http://schemas.microsoft.com/office/drawing/2010/main">
+                <a:solidFill>
+                  <a:srgbClr val="FFFFFF"/>
+                </a:solidFill>
+              </a14:hiddenFill>
+            </a:ext>
+            <a:ext uri="{91240B29-F687-4F45-9708-019B960494DF}">
+              <a14:hiddenLine xmlns:a14="http://schemas.microsoft.com/office/drawing/2010/main" w="9525">
+                <a:solidFill>
+                  <a:srgbClr val="000000"/>
+                </a:solidFill>
+                <a:miter lim="800000"/>
+                <a:headEnd/>
+                <a:tailEnd/>
+              </a14:hiddenLine>
+            </a:ext>
+          </a:extLst>
+        </p:spPr>
+        <p:txBody>
+          <a:bodyPr>
+            <a:spAutoFit/>
+          </a:bodyPr>
+          <a:lstStyle>
+            <a:lvl1pPr>
+              <a:defRPr>
+                <a:solidFill>
+                  <a:schemeClr val="tx1"/>
+                </a:solidFill>
+                <a:latin typeface="Calibri" panose="020F0502020204030204" pitchFamily="34" charset="0"/>
+              </a:defRPr>
+            </a:lvl1pPr>
+            <a:lvl2pPr marL="742950" indent="-285750">
+              <a:defRPr>
+                <a:solidFill>
+                  <a:schemeClr val="tx1"/>
+                </a:solidFill>
+                <a:latin typeface="Calibri" panose="020F0502020204030204" pitchFamily="34" charset="0"/>
+              </a:defRPr>
+            </a:lvl2pPr>
+            <a:lvl3pPr marL="1143000" indent="-228600">
+              <a:defRPr>
+                <a:solidFill>
+                  <a:schemeClr val="tx1"/>
+                </a:solidFill>
+                <a:latin typeface="Calibri" panose="020F0502020204030204" pitchFamily="34" charset="0"/>
+              </a:defRPr>
+            </a:lvl3pPr>
+            <a:lvl4pPr marL="1600200" indent="-228600">
+              <a:defRPr>
+                <a:solidFill>
+                  <a:schemeClr val="tx1"/>
+                </a:solidFill>
+                <a:latin typeface="Calibri" panose="020F0502020204030204" pitchFamily="34" charset="0"/>
+              </a:defRPr>
+            </a:lvl4pPr>
+            <a:lvl5pPr marL="2057400" indent="-228600">
+              <a:defRPr>
+                <a:solidFill>
+                  <a:schemeClr val="tx1"/>
+                </a:solidFill>
+                <a:latin typeface="Calibri" panose="020F0502020204030204" pitchFamily="34" charset="0"/>
+              </a:defRPr>
+            </a:lvl5pPr>
+            <a:lvl6pPr marL="2514600" indent="-228600" eaLnBrk="0" fontAlgn="base" hangingPunct="0">
+              <a:spcBef>
+                <a:spcPct val="0"/>
+              </a:spcBef>
+              <a:spcAft>
+                <a:spcPct val="0"/>
+              </a:spcAft>
+              <a:defRPr>
+                <a:solidFill>
+                  <a:schemeClr val="tx1"/>
+                </a:solidFill>
+                <a:latin typeface="Calibri" panose="020F0502020204030204" pitchFamily="34" charset="0"/>
+              </a:defRPr>
+            </a:lvl6pPr>
+            <a:lvl7pPr marL="2971800" indent="-228600" eaLnBrk="0" fontAlgn="base" hangingPunct="0">
+              <a:spcBef>
+                <a:spcPct val="0"/>
+              </a:spcBef>
+              <a:spcAft>
+                <a:spcPct val="0"/>
+              </a:spcAft>
+              <a:defRPr>
+                <a:solidFill>
+                  <a:schemeClr val="tx1"/>
+                </a:solidFill>
+                <a:latin typeface="Calibri" panose="020F0502020204030204" pitchFamily="34" charset="0"/>
+              </a:defRPr>
+            </a:lvl7pPr>
+            <a:lvl8pPr marL="3429000" indent="-228600" eaLnBrk="0" fontAlgn="base" hangingPunct="0">
+              <a:spcBef>
+                <a:spcPct val="0"/>
+              </a:spcBef>
+              <a:spcAft>
+                <a:spcPct val="0"/>
+              </a:spcAft>
+              <a:defRPr>
+                <a:solidFill>
+                  <a:schemeClr val="tx1"/>
+                </a:solidFill>
+                <a:latin typeface="Calibri" panose="020F0502020204030204" pitchFamily="34" charset="0"/>
+              </a:defRPr>
+            </a:lvl8pPr>
+            <a:lvl9pPr marL="3886200" indent="-228600" eaLnBrk="0" fontAlgn="base" hangingPunct="0">
+              <a:spcBef>
+                <a:spcPct val="0"/>
+              </a:spcBef>
+              <a:spcAft>
+                <a:spcPct val="0"/>
+              </a:spcAft>
+              <a:defRPr>
+                <a:solidFill>
+                  <a:schemeClr val="tx1"/>
+                </a:solidFill>
+                <a:latin typeface="Calibri" panose="020F0502020204030204" pitchFamily="34" charset="0"/>
+              </a:defRPr>
+            </a:lvl9pPr>
+          </a:lstStyle>
+          <a:p>
+            <a:pPr algn="ctr" eaLnBrk="1" hangingPunct="1"/>
+            <a:r>
+              <a:rPr lang="en-US" altLang="en-US" sz="1200" dirty="0">
+                <a:solidFill>
+                  <a:srgbClr val="232F3E"/>
+                </a:solidFill>
+                <a:latin typeface="Arial" panose="020B0604020202020204" pitchFamily="34" charset="0"/>
+                <a:cs typeface="Arial" panose="020B0604020202020204" pitchFamily="34" charset="0"/>
+              </a:rPr>
+              <a:t>Bastion host</a:t>
+            </a:r>
+          </a:p>
+        </p:txBody>
+      </p:sp>
+      <p:sp>
+        <p:nvSpPr>
+          <p:cNvPr id="40" name="Rectangle 39">
+            <a:extLst>
+              <a:ext uri="{FF2B5EF4-FFF2-40B4-BE49-F238E27FC236}">
+                <a16:creationId xmlns:a16="http://schemas.microsoft.com/office/drawing/2014/main" id="{44126751-7C7F-4560-8AE6-4DEEDC36D954}"/>
+              </a:ext>
+            </a:extLst>
+          </p:cNvPr>
+          <p:cNvSpPr/>
+          <p:nvPr/>
+        </p:nvSpPr>
+        <p:spPr>
+          <a:xfrm>
+            <a:off x="2532227" y="2233988"/>
+            <a:ext cx="4371487" cy="969963"/>
+          </a:xfrm>
+          <a:prstGeom prst="rect">
+            <a:avLst/>
+          </a:prstGeom>
+          <a:noFill/>
+          <a:ln w="12700">
+            <a:solidFill>
+              <a:srgbClr val="D86613"/>
+            </a:solidFill>
+            <a:prstDash val="dash"/>
+          </a:ln>
+        </p:spPr>
+        <p:style>
+          <a:lnRef idx="2">
+            <a:schemeClr val="accent1">
+              <a:shade val="50000"/>
+            </a:schemeClr>
+          </a:lnRef>
+          <a:fillRef idx="1">
+            <a:schemeClr val="accent1"/>
+          </a:fillRef>
+          <a:effectRef idx="0">
+            <a:schemeClr val="accent1"/>
+          </a:effectRef>
+          <a:fontRef idx="minor">
+            <a:schemeClr val="lt1"/>
+          </a:fontRef>
+        </p:style>
+        <p:txBody>
+          <a:bodyPr tIns="91440"/>
+          <a:lstStyle/>
+          <a:p>
+            <a:pPr algn="ctr" eaLnBrk="1" fontAlgn="auto" hangingPunct="1">
+              <a:spcBef>
+                <a:spcPts val="0"/>
+              </a:spcBef>
+              <a:spcAft>
+                <a:spcPts val="0"/>
+              </a:spcAft>
+              <a:defRPr/>
+            </a:pPr>
+            <a:endParaRPr lang="en-US" sz="1200" dirty="0">
+              <a:solidFill>
+                <a:srgbClr val="D86613"/>
+              </a:solidFill>
+              <a:latin typeface="Arial" panose="020B0604020202020204" pitchFamily="34" charset="0"/>
+              <a:cs typeface="Arial" panose="020B0604020202020204" pitchFamily="34" charset="0"/>
+            </a:endParaRPr>
+          </a:p>
+          <a:p>
+            <a:pPr algn="ctr" eaLnBrk="1" fontAlgn="auto" hangingPunct="1">
+              <a:spcBef>
+                <a:spcPts val="0"/>
+              </a:spcBef>
+              <a:spcAft>
+                <a:spcPts val="0"/>
+              </a:spcAft>
+              <a:defRPr/>
+            </a:pPr>
+            <a:endParaRPr lang="en-US" sz="1200" dirty="0">
+              <a:solidFill>
+                <a:srgbClr val="D86613"/>
+              </a:solidFill>
+              <a:latin typeface="Arial" panose="020B0604020202020204" pitchFamily="34" charset="0"/>
+              <a:cs typeface="Arial" panose="020B0604020202020204" pitchFamily="34" charset="0"/>
+            </a:endParaRPr>
+          </a:p>
+          <a:p>
+            <a:pPr algn="ctr" eaLnBrk="1" fontAlgn="auto" hangingPunct="1">
+              <a:spcBef>
+                <a:spcPts val="0"/>
+              </a:spcBef>
+              <a:spcAft>
+                <a:spcPts val="0"/>
+              </a:spcAft>
+              <a:defRPr/>
+            </a:pPr>
+            <a:r>
+              <a:rPr lang="en-US" sz="1200" dirty="0">
+                <a:solidFill>
+                  <a:srgbClr val="D86613"/>
+                </a:solidFill>
+                <a:latin typeface="Arial" panose="020B0604020202020204" pitchFamily="34" charset="0"/>
+                <a:cs typeface="Arial" panose="020B0604020202020204" pitchFamily="34" charset="0"/>
+              </a:rPr>
+              <a:t>Auto Scaling group</a:t>
+            </a:r>
+          </a:p>
+        </p:txBody>
+      </p:sp>
+      <p:pic>
+        <p:nvPicPr>
+          <p:cNvPr id="41" name="Graphic 40">
+            <a:extLst>
+              <a:ext uri="{FF2B5EF4-FFF2-40B4-BE49-F238E27FC236}">
+                <a16:creationId xmlns:a16="http://schemas.microsoft.com/office/drawing/2014/main" id="{B5E95C62-1BA8-42E7-BEF9-2976003BF108}"/>
+              </a:ext>
+            </a:extLst>
+          </p:cNvPr>
+          <p:cNvPicPr>
+            <a:picLocks noChangeAspect="1"/>
+          </p:cNvPicPr>
+          <p:nvPr/>
+        </p:nvPicPr>
+        <p:blipFill>
+          <a:blip r:embed="rId17">
+            <a:extLst>
+              <a:ext uri="{96DAC541-7B7A-43D3-8B79-37D633B846F1}">
+                <asvg:svgBlip xmlns:asvg="http://schemas.microsoft.com/office/drawing/2016/SVG/main" r:embed="rId18"/>
+              </a:ext>
+            </a:extLst>
+          </a:blip>
+          <a:stretch>
+            <a:fillRect/>
+          </a:stretch>
+        </p:blipFill>
+        <p:spPr>
+          <a:xfrm>
+            <a:off x="4536530" y="2239090"/>
+            <a:ext cx="381000" cy="381000"/>
+          </a:xfrm>
+          <a:prstGeom prst="rect">
+            <a:avLst/>
+          </a:prstGeom>
         </p:spPr>
       </p:pic>
     </p:spTree>

</xml_diff>